<commit_message>
Modified Presentation and Speech.
</commit_message>
<xml_diff>
--- a/Presentation.pptx
+++ b/Presentation.pptx
@@ -20739,8 +20739,8 @@
           </a:p>
         </p:txBody>
       </p:sp>
-      <mc:AlternateContent xmlns:mc="http://schemas.openxmlformats.org/markup-compatibility/2006">
-        <mc:Choice xmlns:a14="http://schemas.microsoft.com/office/drawing/2010/main" Requires="a14">
+      <mc:AlternateContent xmlns:mc="http://schemas.openxmlformats.org/markup-compatibility/2006" xmlns:a14="http://schemas.microsoft.com/office/drawing/2010/main">
+        <mc:Choice Requires="a14">
           <p:sp>
             <p:nvSpPr>
               <p:cNvPr id="4" name="Rectangle 1">
@@ -21129,7 +21129,7 @@
             </p:txBody>
           </p:sp>
         </mc:Choice>
-        <mc:Fallback>
+        <mc:Fallback xmlns="">
           <p:sp>
             <p:nvSpPr>
               <p:cNvPr id="4" name="Rectangle 1">
@@ -34428,8 +34428,8 @@
           </a:p>
         </p:txBody>
       </p:sp>
-      <mc:AlternateContent xmlns:mc="http://schemas.openxmlformats.org/markup-compatibility/2006">
-        <mc:Choice xmlns:a14="http://schemas.microsoft.com/office/drawing/2010/main" Requires="a14">
+      <mc:AlternateContent xmlns:mc="http://schemas.openxmlformats.org/markup-compatibility/2006" xmlns:a14="http://schemas.microsoft.com/office/drawing/2010/main">
+        <mc:Choice Requires="a14">
           <p:sp>
             <p:nvSpPr>
               <p:cNvPr id="6" name="object 3">
@@ -34700,7 +34700,7 @@
             </p:txBody>
           </p:sp>
         </mc:Choice>
-        <mc:Fallback>
+        <mc:Fallback xmlns="">
           <p:sp>
             <p:nvSpPr>
               <p:cNvPr id="6" name="object 3">
@@ -36286,8 +36286,8 @@
           </a:p>
         </p:txBody>
       </p:sp>
-      <mc:AlternateContent xmlns:mc="http://schemas.openxmlformats.org/markup-compatibility/2006">
-        <mc:Choice xmlns:a14="http://schemas.microsoft.com/office/drawing/2010/main" Requires="a14">
+      <mc:AlternateContent xmlns:mc="http://schemas.openxmlformats.org/markup-compatibility/2006" xmlns:a14="http://schemas.microsoft.com/office/drawing/2010/main">
+        <mc:Choice Requires="a14">
           <p:sp>
             <p:nvSpPr>
               <p:cNvPr id="3" name="Content Placeholder 2"/>
@@ -36877,7 +36877,7 @@
             </p:txBody>
           </p:sp>
         </mc:Choice>
-        <mc:Fallback>
+        <mc:Fallback xmlns="">
           <p:sp>
             <p:nvSpPr>
               <p:cNvPr id="3" name="Content Placeholder 2"/>
@@ -37472,8 +37472,8 @@
           </a:p>
         </p:txBody>
       </p:sp>
-      <mc:AlternateContent xmlns:mc="http://schemas.openxmlformats.org/markup-compatibility/2006">
-        <mc:Choice xmlns:a14="http://schemas.microsoft.com/office/drawing/2010/main" Requires="a14">
+      <mc:AlternateContent xmlns:mc="http://schemas.openxmlformats.org/markup-compatibility/2006" xmlns:a14="http://schemas.microsoft.com/office/drawing/2010/main">
+        <mc:Choice Requires="a14">
           <p:sp>
             <p:nvSpPr>
               <p:cNvPr id="3" name="Content Placeholder 2">
@@ -38071,7 +38071,7 @@
             </p:txBody>
           </p:sp>
         </mc:Choice>
-        <mc:Fallback>
+        <mc:Fallback xmlns="">
           <p:sp>
             <p:nvSpPr>
               <p:cNvPr id="3" name="Content Placeholder 2">

</xml_diff>

<commit_message>
Modified Presentations and Converted the bullet point speech into a discursive one.
</commit_message>
<xml_diff>
--- a/Presentation.pptx
+++ b/Presentation.pptx
@@ -13815,7 +13815,7 @@
             </a:r>
             <a:r>
               <a:rPr lang="it-IT" sz="2400" dirty="0"/>
-              <a:t>attraverso un'analisi approfondita.</a:t>
+              <a:t>attraverso un'analisi approfondita:</a:t>
             </a:r>
           </a:p>
           <a:p>
@@ -17946,7 +17946,7 @@
         </p:blipFill>
         <p:spPr>
           <a:xfrm>
-            <a:off x="5559853" y="3406544"/>
+            <a:off x="5633005" y="2867402"/>
             <a:ext cx="6387198" cy="2677300"/>
           </a:xfrm>
           <a:prstGeom prst="rect">
@@ -17956,208 +17956,10 @@
       </p:pic>
       <p:sp>
         <p:nvSpPr>
-          <p:cNvPr id="13" name="Rectangle 3">
+          <p:cNvPr id="5" name="CasellaDiTesto 4">
             <a:extLst>
               <a:ext uri="{FF2B5EF4-FFF2-40B4-BE49-F238E27FC236}">
-                <a16:creationId xmlns:a16="http://schemas.microsoft.com/office/drawing/2014/main" id="{808B22BA-1795-62B7-49D1-E1B5741902DE}"/>
-              </a:ext>
-            </a:extLst>
-          </p:cNvPr>
-          <p:cNvSpPr>
-            <a:spLocks noChangeArrowheads="1"/>
-          </p:cNvSpPr>
-          <p:nvPr/>
-        </p:nvSpPr>
-        <p:spPr bwMode="auto">
-          <a:xfrm>
-            <a:off x="506648" y="3591032"/>
-            <a:ext cx="5318079" cy="2308324"/>
-          </a:xfrm>
-          <a:prstGeom prst="rect">
-            <a:avLst/>
-          </a:prstGeom>
-          <a:noFill/>
-          <a:ln>
-            <a:noFill/>
-          </a:ln>
-          <a:effectLst/>
-          <a:extLst>
-            <a:ext uri="{909E8E84-426E-40DD-AFC4-6F175D3DCCD1}">
-              <a14:hiddenFill xmlns:a14="http://schemas.microsoft.com/office/drawing/2010/main">
-                <a:solidFill>
-                  <a:schemeClr val="accent1"/>
-                </a:solidFill>
-              </a14:hiddenFill>
-            </a:ext>
-            <a:ext uri="{91240B29-F687-4F45-9708-019B960494DF}">
-              <a14:hiddenLine xmlns:a14="http://schemas.microsoft.com/office/drawing/2010/main" w="9525">
-                <a:solidFill>
-                  <a:schemeClr val="tx1"/>
-                </a:solidFill>
-                <a:miter lim="800000"/>
-                <a:headEnd/>
-                <a:tailEnd/>
-              </a14:hiddenLine>
-            </a:ext>
-            <a:ext uri="{AF507438-7753-43E0-B8FC-AC1667EBCBE1}">
-              <a14:hiddenEffects xmlns:a14="http://schemas.microsoft.com/office/drawing/2010/main">
-                <a:effectLst>
-                  <a:outerShdw dist="35921" dir="2700000" algn="ctr" rotWithShape="0">
-                    <a:schemeClr val="bg2"/>
-                  </a:outerShdw>
-                </a:effectLst>
-              </a14:hiddenEffects>
-            </a:ext>
-          </a:extLst>
-        </p:spPr>
-        <p:txBody>
-          <a:bodyPr vert="horz" wrap="square" lIns="91440" tIns="45720" rIns="91440" bIns="45720" numCol="1" anchor="ctr" anchorCtr="0" compatLnSpc="1">
-            <a:prstTxWarp prst="textNoShape">
-              <a:avLst/>
-            </a:prstTxWarp>
-            <a:spAutoFit/>
-          </a:bodyPr>
-          <a:lstStyle/>
-          <a:p>
-            <a:pPr marL="285750" marR="0" lvl="0" indent="-285750" algn="l" defTabSz="914400" rtl="0" eaLnBrk="0" fontAlgn="base" latinLnBrk="0" hangingPunct="0">
-              <a:lnSpc>
-                <a:spcPct val="100000"/>
-              </a:lnSpc>
-              <a:spcBef>
-                <a:spcPct val="0"/>
-              </a:spcBef>
-              <a:spcAft>
-                <a:spcPct val="0"/>
-              </a:spcAft>
-              <a:buClrTx/>
-              <a:buSzTx/>
-              <a:buFont typeface="Arial" panose="020B0604020202020204" pitchFamily="34" charset="0"/>
-              <a:buChar char="•"/>
-              <a:tabLst/>
-            </a:pPr>
-            <a:r>
-              <a:rPr lang="it-IT" altLang="it-IT" dirty="0"/>
-              <a:t>Le </a:t>
-            </a:r>
-            <a:r>
-              <a:rPr lang="it-IT" altLang="it-IT" b="1" dirty="0"/>
-              <a:t>B-</a:t>
-            </a:r>
-            <a:r>
-              <a:rPr lang="it-IT" altLang="it-IT" b="1" dirty="0" err="1"/>
-              <a:t>spline</a:t>
-            </a:r>
-            <a:r>
-              <a:rPr lang="it-IT" altLang="it-IT" dirty="0"/>
-              <a:t> sono </a:t>
-            </a:r>
-            <a:r>
-              <a:rPr lang="it-IT" altLang="it-IT" b="1" dirty="0"/>
-              <a:t>funzioni polinomiali a tratti</a:t>
-            </a:r>
-            <a:r>
-              <a:rPr lang="it-IT" altLang="it-IT" dirty="0"/>
-              <a:t>.</a:t>
-            </a:r>
-          </a:p>
-          <a:p>
-            <a:pPr marL="285750" marR="0" lvl="0" indent="-285750" algn="l" defTabSz="914400" rtl="0" eaLnBrk="0" fontAlgn="base" latinLnBrk="0" hangingPunct="0">
-              <a:lnSpc>
-                <a:spcPct val="100000"/>
-              </a:lnSpc>
-              <a:spcBef>
-                <a:spcPct val="0"/>
-              </a:spcBef>
-              <a:spcAft>
-                <a:spcPct val="0"/>
-              </a:spcAft>
-              <a:buClrTx/>
-              <a:buSzTx/>
-              <a:buFont typeface="Arial" panose="020B0604020202020204" pitchFamily="34" charset="0"/>
-              <a:buChar char="•"/>
-              <a:tabLst/>
-            </a:pPr>
-            <a:r>
-              <a:rPr lang="it-IT" altLang="it-IT" dirty="0"/>
-              <a:t>Sono </a:t>
-            </a:r>
-            <a:r>
-              <a:rPr lang="it-IT" altLang="it-IT" b="1" dirty="0"/>
-              <a:t>continue</a:t>
-            </a:r>
-            <a:r>
-              <a:rPr lang="it-IT" altLang="it-IT" dirty="0"/>
-              <a:t> e </a:t>
-            </a:r>
-            <a:r>
-              <a:rPr lang="it-IT" altLang="it-IT" b="1" dirty="0"/>
-              <a:t>differenziabili</a:t>
-            </a:r>
-            <a:r>
-              <a:rPr lang="it-IT" altLang="it-IT" dirty="0"/>
-              <a:t>.</a:t>
-            </a:r>
-          </a:p>
-          <a:p>
-            <a:pPr marL="285750" marR="0" lvl="0" indent="-285750" algn="l" defTabSz="914400" rtl="0" eaLnBrk="0" fontAlgn="base" latinLnBrk="0" hangingPunct="0">
-              <a:lnSpc>
-                <a:spcPct val="100000"/>
-              </a:lnSpc>
-              <a:spcBef>
-                <a:spcPct val="0"/>
-              </a:spcBef>
-              <a:spcAft>
-                <a:spcPct val="0"/>
-              </a:spcAft>
-              <a:buClrTx/>
-              <a:buSzTx/>
-              <a:buFont typeface="Arial" panose="020B0604020202020204" pitchFamily="34" charset="0"/>
-              <a:buChar char="•"/>
-              <a:tabLst/>
-            </a:pPr>
-            <a:r>
-              <a:rPr lang="it-IT" altLang="it-IT" dirty="0"/>
-              <a:t>Hanno </a:t>
-            </a:r>
-            <a:r>
-              <a:rPr lang="it-IT" altLang="it-IT" b="1" dirty="0"/>
-              <a:t>controllo locale</a:t>
-            </a:r>
-            <a:r>
-              <a:rPr lang="it-IT" altLang="it-IT" dirty="0"/>
-              <a:t>: cambiare un punto di controllo influisce solo su una zona locale della curva.</a:t>
-            </a:r>
-          </a:p>
-          <a:p>
-            <a:pPr marL="285750" marR="0" lvl="0" indent="-285750" algn="l" defTabSz="914400" rtl="0" eaLnBrk="0" fontAlgn="base" latinLnBrk="0" hangingPunct="0">
-              <a:lnSpc>
-                <a:spcPct val="100000"/>
-              </a:lnSpc>
-              <a:spcBef>
-                <a:spcPct val="0"/>
-              </a:spcBef>
-              <a:spcAft>
-                <a:spcPct val="0"/>
-              </a:spcAft>
-              <a:buClrTx/>
-              <a:buSzTx/>
-              <a:buFont typeface="Arial" panose="020B0604020202020204" pitchFamily="34" charset="0"/>
-              <a:buChar char="•"/>
-              <a:tabLst/>
-            </a:pPr>
-            <a:r>
-              <a:rPr lang="it-IT" altLang="it-IT" dirty="0"/>
-              <a:t>I coefficienti della loro rappresentazione possono essere imparati dalla rete durante il processo di training.</a:t>
-            </a:r>
-          </a:p>
-        </p:txBody>
-      </p:sp>
-      <p:sp>
-        <p:nvSpPr>
-          <p:cNvPr id="4" name="CasellaDiTesto 3">
-            <a:extLst>
-              <a:ext uri="{FF2B5EF4-FFF2-40B4-BE49-F238E27FC236}">
-                <a16:creationId xmlns:a16="http://schemas.microsoft.com/office/drawing/2014/main" id="{63879D1D-D5F8-172B-D44A-D73FDC92709C}"/>
+                <a16:creationId xmlns:a16="http://schemas.microsoft.com/office/drawing/2014/main" id="{4D3E33FA-10C3-D03A-7991-145E593CD74A}"/>
               </a:ext>
             </a:extLst>
           </p:cNvPr>
@@ -18166,8 +17968,8 @@
         </p:nvSpPr>
         <p:spPr>
           <a:xfrm>
-            <a:off x="694817" y="2043448"/>
-            <a:ext cx="10656026" cy="1354217"/>
+            <a:off x="525780" y="2650568"/>
+            <a:ext cx="5705792" cy="3477875"/>
           </a:xfrm>
           <a:prstGeom prst="rect">
             <a:avLst/>
@@ -18180,126 +17982,164 @@
           </a:bodyPr>
           <a:lstStyle/>
           <a:p>
-            <a:pPr lvl="0" defTabSz="914400" eaLnBrk="0" fontAlgn="base" hangingPunct="0">
-              <a:spcBef>
-                <a:spcPct val="0"/>
-              </a:spcBef>
-              <a:spcAft>
-                <a:spcPct val="0"/>
-              </a:spcAft>
+            <a:r>
+              <a:rPr lang="it-IT" sz="2000" b="1" dirty="0"/>
+              <a:t>Vantaggi Rispetto alle Curve di </a:t>
+            </a:r>
+            <a:r>
+              <a:rPr lang="it-IT" sz="2000" b="1" dirty="0" err="1"/>
+              <a:t>Bézier</a:t>
+            </a:r>
+            <a:endParaRPr lang="it-IT" sz="2000" b="1" dirty="0"/>
+          </a:p>
+          <a:p>
+            <a:pPr marL="342900" indent="-342900">
+              <a:buFont typeface="Arial" panose="020B0604020202020204" pitchFamily="34" charset="0"/>
+              <a:buChar char="•"/>
             </a:pPr>
             <a:r>
-              <a:rPr lang="it-IT" altLang="it-IT" sz="1600" dirty="0"/>
-              <a:t>Una </a:t>
-            </a:r>
-            <a:r>
-              <a:rPr lang="it-IT" altLang="it-IT" sz="1600" b="1" dirty="0"/>
-              <a:t>curva di </a:t>
-            </a:r>
-            <a:r>
-              <a:rPr lang="it-IT" altLang="it-IT" sz="1600" b="1" dirty="0" err="1"/>
+              <a:rPr lang="it-IT" sz="2000" b="1" dirty="0"/>
+              <a:t>Controllo Locale</a:t>
+            </a:r>
+            <a:r>
+              <a:rPr lang="it-IT" sz="2000" dirty="0"/>
+              <a:t>: La modifica di un punto di controllo influisce solo su una zona locale della curva (non è necessario ricalcolare tutto).</a:t>
+            </a:r>
+          </a:p>
+          <a:p>
+            <a:pPr marL="342900" indent="-342900">
+              <a:buFont typeface="Arial" panose="020B0604020202020204" pitchFamily="34" charset="0"/>
+              <a:buChar char="•"/>
+            </a:pPr>
+            <a:r>
+              <a:rPr lang="it-IT" sz="2000" b="1" dirty="0"/>
+              <a:t>Scalabilità</a:t>
+            </a:r>
+            <a:r>
+              <a:rPr lang="it-IT" sz="2000" dirty="0"/>
+              <a:t>: Il grado del polinomio è fisso e non dipende strettamente dal numero di punti di controllo (evita la complessità n−1).</a:t>
+            </a:r>
+          </a:p>
+          <a:p>
+            <a:r>
+              <a:rPr lang="it-IT" sz="2000" dirty="0"/>
+              <a:t>Caratteristiche Fondamentali</a:t>
+            </a:r>
+          </a:p>
+          <a:p>
+            <a:pPr marL="342900" indent="-342900">
+              <a:buFont typeface="Arial" panose="020B0604020202020204" pitchFamily="34" charset="0"/>
+              <a:buChar char="•"/>
+            </a:pPr>
+            <a:r>
+              <a:rPr lang="it-IT" sz="2000" dirty="0"/>
+              <a:t>Sono </a:t>
+            </a:r>
+            <a:r>
+              <a:rPr lang="it-IT" sz="2000" b="1" dirty="0"/>
+              <a:t>continue e differenziabili</a:t>
+            </a:r>
+            <a:r>
+              <a:rPr lang="it-IT" sz="2000" dirty="0"/>
+              <a:t>.</a:t>
+            </a:r>
+          </a:p>
+          <a:p>
+            <a:pPr marL="342900" indent="-342900">
+              <a:buFont typeface="Arial" panose="020B0604020202020204" pitchFamily="34" charset="0"/>
+              <a:buChar char="•"/>
+            </a:pPr>
+            <a:r>
+              <a:rPr lang="it-IT" sz="2000" dirty="0"/>
+              <a:t>I loro </a:t>
+            </a:r>
+            <a:r>
+              <a:rPr lang="it-IT" sz="2000" b="1" dirty="0"/>
+              <a:t>coefficienti</a:t>
+            </a:r>
+            <a:r>
+              <a:rPr lang="it-IT" sz="2000" dirty="0"/>
+              <a:t> possono essere </a:t>
+            </a:r>
+            <a:r>
+              <a:rPr lang="it-IT" sz="2000" b="1" dirty="0"/>
+              <a:t>imparati</a:t>
+            </a:r>
+            <a:r>
+              <a:rPr lang="it-IT" sz="2000" dirty="0"/>
+              <a:t> da una rete neurale </a:t>
+            </a:r>
+            <a:r>
+              <a:rPr lang="it-IT" sz="2000" b="1" dirty="0"/>
+              <a:t>durante il processo di training</a:t>
+            </a:r>
+            <a:r>
+              <a:rPr lang="it-IT" sz="2000" dirty="0"/>
+              <a:t>.</a:t>
+            </a:r>
+          </a:p>
+        </p:txBody>
+      </p:sp>
+      <p:sp>
+        <p:nvSpPr>
+          <p:cNvPr id="8" name="CasellaDiTesto 7">
+            <a:extLst>
+              <a:ext uri="{FF2B5EF4-FFF2-40B4-BE49-F238E27FC236}">
+                <a16:creationId xmlns:a16="http://schemas.microsoft.com/office/drawing/2014/main" id="{5FEE72D9-360B-07AF-CBDA-2D059FAD405C}"/>
+              </a:ext>
+            </a:extLst>
+          </p:cNvPr>
+          <p:cNvSpPr txBox="1"/>
+          <p:nvPr/>
+        </p:nvSpPr>
+        <p:spPr>
+          <a:xfrm>
+            <a:off x="1619535" y="2068385"/>
+            <a:ext cx="8949754" cy="400110"/>
+          </a:xfrm>
+          <a:prstGeom prst="rect">
+            <a:avLst/>
+          </a:prstGeom>
+          <a:noFill/>
+        </p:spPr>
+        <p:txBody>
+          <a:bodyPr wrap="square">
+            <a:spAutoFit/>
+          </a:bodyPr>
+          <a:lstStyle/>
+          <a:p>
+            <a:r>
+              <a:rPr lang="it-IT" sz="1800" dirty="0"/>
+              <a:t>Le </a:t>
+            </a:r>
+            <a:r>
+              <a:rPr lang="it-IT" sz="2000" b="1" dirty="0"/>
+              <a:t>B-</a:t>
+            </a:r>
+            <a:r>
+              <a:rPr lang="it-IT" sz="2000" b="1" dirty="0" err="1"/>
+              <a:t>spline</a:t>
+            </a:r>
+            <a:r>
+              <a:rPr lang="it-IT" sz="1800" dirty="0"/>
+              <a:t> sono </a:t>
+            </a:r>
+            <a:r>
+              <a:rPr lang="it-IT" sz="2000" b="1" dirty="0"/>
+              <a:t>funzioni polinomiali a tratti </a:t>
+            </a:r>
+            <a:r>
+              <a:rPr lang="it-IT" sz="1800" dirty="0"/>
+              <a:t>che risolvono le criticità delle curve di </a:t>
+            </a:r>
+            <a:r>
+              <a:rPr lang="it-IT" sz="1800" dirty="0" err="1"/>
               <a:t>Bézier</a:t>
             </a:r>
             <a:r>
-              <a:rPr lang="it-IT" altLang="it-IT" sz="1600" dirty="0"/>
-              <a:t> è una </a:t>
-            </a:r>
-            <a:r>
-              <a:rPr lang="it-IT" altLang="it-IT" sz="1600" b="1" dirty="0"/>
-              <a:t>curva parametrica</a:t>
-            </a:r>
-            <a:r>
-              <a:rPr lang="it-IT" altLang="it-IT" sz="1600" dirty="0"/>
-              <a:t>, dove tutte le coordinate della curva dipendono da una variabile indipendente t.</a:t>
-            </a:r>
-          </a:p>
-          <a:p>
-            <a:pPr lvl="0" defTabSz="914400" eaLnBrk="0" fontAlgn="base" hangingPunct="0">
-              <a:spcBef>
-                <a:spcPct val="0"/>
-              </a:spcBef>
-              <a:spcAft>
-                <a:spcPct val="0"/>
-              </a:spcAft>
-            </a:pPr>
-            <a:endParaRPr lang="it-IT" altLang="it-IT" sz="1600" dirty="0"/>
-          </a:p>
-          <a:p>
-            <a:pPr lvl="0" defTabSz="914400" eaLnBrk="0" fontAlgn="base" hangingPunct="0">
-              <a:spcBef>
-                <a:spcPct val="0"/>
-              </a:spcBef>
-              <a:spcAft>
-                <a:spcPct val="0"/>
-              </a:spcAft>
-            </a:pPr>
-            <a:r>
-              <a:rPr lang="it-IT" altLang="it-IT" sz="1600" dirty="0"/>
-              <a:t>Problema 1: Se ho </a:t>
-            </a:r>
-            <a:r>
-              <a:rPr lang="it-IT" sz="1600" dirty="0"/>
-              <a:t>𝑛</a:t>
-            </a:r>
-            <a:r>
-              <a:rPr lang="it-IT" altLang="it-IT" sz="1600" dirty="0"/>
-              <a:t> punti di controllo, devo usare una curva di </a:t>
-            </a:r>
-            <a:r>
-              <a:rPr lang="it-IT" altLang="it-IT" sz="1600" dirty="0" err="1"/>
-              <a:t>Bézier</a:t>
-            </a:r>
-            <a:r>
-              <a:rPr lang="it-IT" altLang="it-IT" sz="1600" dirty="0"/>
-              <a:t> di grado </a:t>
-            </a:r>
-            <a:r>
-              <a:rPr lang="it-IT" sz="1600" dirty="0"/>
-              <a:t>𝑛 </a:t>
-            </a:r>
-            <a:r>
-              <a:rPr lang="it-IT" altLang="it-IT" sz="1600" dirty="0"/>
-              <a:t>– 1 (</a:t>
-            </a:r>
-            <a:r>
-              <a:rPr lang="it-IT" altLang="it-IT" sz="1600" b="1" dirty="0" err="1"/>
-              <a:t>computazionalmente</a:t>
-            </a:r>
-            <a:r>
-              <a:rPr lang="it-IT" altLang="it-IT" sz="1600" b="1" dirty="0"/>
-              <a:t> complesso da calcolare all’aumenta di </a:t>
-            </a:r>
-            <a:r>
-              <a:rPr lang="it-IT" sz="1600" b="1" dirty="0"/>
-              <a:t>𝑛</a:t>
-            </a:r>
-            <a:r>
-              <a:rPr lang="it-IT" altLang="it-IT" sz="1600" dirty="0"/>
-              <a:t>).</a:t>
-            </a:r>
-          </a:p>
-          <a:p>
-            <a:pPr lvl="0" defTabSz="914400" eaLnBrk="0" fontAlgn="base" hangingPunct="0">
-              <a:spcBef>
-                <a:spcPct val="0"/>
-              </a:spcBef>
-              <a:spcAft>
-                <a:spcPct val="0"/>
-              </a:spcAft>
-            </a:pPr>
-            <a:r>
-              <a:rPr lang="it-IT" altLang="it-IT" sz="1600" dirty="0"/>
-              <a:t>Problema 2: Se sposto un punto di controllo, devo ricalcolare l'intera curva (</a:t>
-            </a:r>
-            <a:r>
-              <a:rPr lang="it-IT" altLang="it-IT" sz="1600" b="1" dirty="0"/>
-              <a:t>non ho controllo locale</a:t>
-            </a:r>
-            <a:r>
-              <a:rPr lang="it-IT" altLang="it-IT" sz="1600" dirty="0"/>
-              <a:t>).</a:t>
-            </a:r>
-            <a:endParaRPr lang="it-IT" sz="1600" dirty="0"/>
+              <a:rPr lang="it-IT" sz="1800" dirty="0"/>
+              <a:t>.</a:t>
+            </a:r>
           </a:p>
         </p:txBody>
       </p:sp>
@@ -18792,7 +18632,7 @@
             </a:r>
             <a:r>
               <a:rPr lang="it-IT" sz="4000" dirty="0"/>
-              <a:t> (KART) - KAN</a:t>
+              <a:t> (KART)</a:t>
             </a:r>
           </a:p>
         </p:txBody>
@@ -18865,8 +18705,8 @@
           </a:p>
         </p:txBody>
       </p:sp>
-      <mc:AlternateContent xmlns:mc="http://schemas.openxmlformats.org/markup-compatibility/2006">
-        <mc:Choice xmlns:a14="http://schemas.microsoft.com/office/drawing/2010/main" Requires="a14">
+      <mc:AlternateContent xmlns:mc="http://schemas.openxmlformats.org/markup-compatibility/2006" xmlns:a14="http://schemas.microsoft.com/office/drawing/2010/main">
+        <mc:Choice Requires="a14">
           <p:sp>
             <p:nvSpPr>
               <p:cNvPr id="3" name="Content Placeholder 2">
@@ -19356,7 +19196,7 @@
             </p:txBody>
           </p:sp>
         </mc:Choice>
-        <mc:Fallback>
+        <mc:Fallback xmlns="">
           <p:sp>
             <p:nvSpPr>
               <p:cNvPr id="3" name="Content Placeholder 2">
@@ -19914,12 +19754,8 @@
           </a:p>
           <a:p>
             <a:r>
-              <a:rPr lang="it-IT" sz="2000" dirty="0"/>
-              <a:t>Ottime per </a:t>
-            </a:r>
-            <a:r>
               <a:rPr lang="it-IT" sz="2000" b="1" dirty="0"/>
-              <a:t>dati a bassa dimensionalità</a:t>
+              <a:t>Efficacia a bassa dimensionalità</a:t>
             </a:r>
             <a:r>
               <a:rPr lang="it-IT" sz="2000" dirty="0"/>
@@ -19929,20 +19765,9 @@
           <a:p>
             <a:r>
               <a:rPr lang="it-IT" sz="2000" b="1" dirty="0"/>
-              <a:t>Controllo locale </a:t>
-            </a:r>
-            <a:r>
-              <a:rPr lang="it-IT" sz="2000" dirty="0"/>
-              <a:t>utile per l'apprendimento continuo (</a:t>
-            </a:r>
-            <a:r>
-              <a:rPr lang="it-IT" sz="2000" dirty="0" err="1"/>
-              <a:t>Continual</a:t>
-            </a:r>
-            <a:r>
-              <a:rPr lang="it-IT" sz="2000" dirty="0"/>
-              <a:t> Learning).</a:t>
-            </a:r>
+              <a:t>Controllo locale.</a:t>
+            </a:r>
+            <a:endParaRPr lang="it-IT" sz="2000" dirty="0"/>
           </a:p>
           <a:p>
             <a:pPr marL="0" indent="0">

</xml_diff>